<commit_message>
report part of functions
</commit_message>
<xml_diff>
--- a/Report/ER Diagram.pptx
+++ b/Report/ER Diagram.pptx
@@ -7330,13 +7330,13 @@
           <a:p>
             <a:pPr algn="ctr"/>
             <a:r>
-              <a:rPr lang="en-US" altLang="zh-TW" sz="1250" dirty="0">
+              <a:rPr lang="en-US" altLang="zh-TW" sz="1250" u="sng" dirty="0">
                 <a:latin typeface="標楷體" panose="03000509000000000000" pitchFamily="65" charset="-120"/>
                 <a:ea typeface="標楷體" panose="03000509000000000000" pitchFamily="65" charset="-120"/>
               </a:rPr>
               <a:t>username</a:t>
             </a:r>
-            <a:endParaRPr lang="zh-TW" altLang="en-US" sz="1250" dirty="0">
+            <a:endParaRPr lang="zh-TW" altLang="en-US" sz="1250" u="sng" dirty="0">
               <a:latin typeface="標楷體" panose="03000509000000000000" pitchFamily="65" charset="-120"/>
               <a:ea typeface="標楷體" panose="03000509000000000000" pitchFamily="65" charset="-120"/>
             </a:endParaRPr>
@@ -7534,7 +7534,7 @@
         </p:nvSpPr>
         <p:spPr>
           <a:xfrm>
-            <a:off x="2006822" y="40042"/>
+            <a:off x="2006822" y="13409"/>
             <a:ext cx="1158877" cy="462712"/>
           </a:xfrm>
           <a:prstGeom prst="ellipse">
@@ -7563,13 +7563,13 @@
           <a:p>
             <a:pPr algn="ctr"/>
             <a:r>
-              <a:rPr lang="en-US" altLang="zh-TW" sz="1600" dirty="0">
+              <a:rPr lang="en-US" altLang="zh-TW" sz="1600" u="sng" dirty="0">
                 <a:latin typeface="標楷體" panose="03000509000000000000" pitchFamily="65" charset="-120"/>
                 <a:ea typeface="標楷體" panose="03000509000000000000" pitchFamily="65" charset="-120"/>
               </a:rPr>
               <a:t>id</a:t>
             </a:r>
-            <a:endParaRPr lang="zh-TW" altLang="en-US" sz="1600" dirty="0">
+            <a:endParaRPr lang="zh-TW" altLang="en-US" sz="1600" u="sng" dirty="0">
               <a:latin typeface="標楷體" panose="03000509000000000000" pitchFamily="65" charset="-120"/>
               <a:ea typeface="標楷體" panose="03000509000000000000" pitchFamily="65" charset="-120"/>
             </a:endParaRPr>
@@ -7593,8 +7593,8 @@
         </p:nvCxnSpPr>
         <p:spPr>
           <a:xfrm>
-            <a:off x="2586261" y="502754"/>
-            <a:ext cx="2" cy="287476"/>
+            <a:off x="2586261" y="476121"/>
+            <a:ext cx="2" cy="314109"/>
           </a:xfrm>
           <a:prstGeom prst="line">
             <a:avLst/>
@@ -7658,13 +7658,13 @@
           <a:p>
             <a:pPr algn="ctr"/>
             <a:r>
-              <a:rPr lang="en-US" altLang="zh-TW" sz="1600" dirty="0">
+              <a:rPr lang="en-US" altLang="zh-TW" sz="1600" u="sng" dirty="0">
                 <a:latin typeface="標楷體" panose="03000509000000000000" pitchFamily="65" charset="-120"/>
                 <a:ea typeface="標楷體" panose="03000509000000000000" pitchFamily="65" charset="-120"/>
               </a:rPr>
               <a:t>id</a:t>
             </a:r>
-            <a:endParaRPr lang="zh-TW" altLang="en-US" sz="1600" dirty="0">
+            <a:endParaRPr lang="zh-TW" altLang="en-US" sz="1600" u="sng" dirty="0">
               <a:latin typeface="標楷體" panose="03000509000000000000" pitchFamily="65" charset="-120"/>
               <a:ea typeface="標楷體" panose="03000509000000000000" pitchFamily="65" charset="-120"/>
             </a:endParaRPr>
@@ -7754,13 +7754,13 @@
           <a:p>
             <a:pPr algn="ctr"/>
             <a:r>
-              <a:rPr lang="en-US" altLang="zh-TW" sz="1600" dirty="0">
+              <a:rPr lang="en-US" altLang="zh-TW" sz="1600" u="sng" dirty="0">
                 <a:latin typeface="標楷體" panose="03000509000000000000" pitchFamily="65" charset="-120"/>
                 <a:ea typeface="標楷體" panose="03000509000000000000" pitchFamily="65" charset="-120"/>
               </a:rPr>
               <a:t>id</a:t>
             </a:r>
-            <a:endParaRPr lang="zh-TW" altLang="en-US" sz="1600" dirty="0">
+            <a:endParaRPr lang="zh-TW" altLang="en-US" sz="1600" u="sng" dirty="0">
               <a:latin typeface="標楷體" panose="03000509000000000000" pitchFamily="65" charset="-120"/>
               <a:ea typeface="標楷體" panose="03000509000000000000" pitchFamily="65" charset="-120"/>
             </a:endParaRPr>
@@ -7850,13 +7850,13 @@
           <a:p>
             <a:pPr algn="ctr"/>
             <a:r>
-              <a:rPr lang="en-US" altLang="zh-TW" sz="1600" dirty="0">
+              <a:rPr lang="en-US" altLang="zh-TW" sz="1600" u="sng" dirty="0">
                 <a:latin typeface="標楷體" panose="03000509000000000000" pitchFamily="65" charset="-120"/>
                 <a:ea typeface="標楷體" panose="03000509000000000000" pitchFamily="65" charset="-120"/>
               </a:rPr>
               <a:t>id</a:t>
             </a:r>
-            <a:endParaRPr lang="zh-TW" altLang="en-US" sz="1600" dirty="0">
+            <a:endParaRPr lang="zh-TW" altLang="en-US" sz="1600" u="sng" dirty="0">
               <a:latin typeface="標楷體" panose="03000509000000000000" pitchFamily="65" charset="-120"/>
               <a:ea typeface="標楷體" panose="03000509000000000000" pitchFamily="65" charset="-120"/>
             </a:endParaRPr>

</xml_diff>